<commit_message>
Change 'Supported' to 'Refuted'
</commit_message>
<xml_diff>
--- a/assets/ntcir-19-dataset_example.pptx
+++ b/assets/ntcir-19-dataset_example.pptx
@@ -1873,7 +1873,7 @@
           <a:p>
             <a:fld id="{32F68AFB-3DBA-4041-9C55-6494DFF30A69}" type="datetimeFigureOut">
               <a:rPr lang="en-GB" smtClean="0"/>
-              <a:t>20/10/2025</a:t>
+              <a:t>28/01/2026</a:t>
             </a:fld>
             <a:endParaRPr lang="en-GB"/>
           </a:p>
@@ -2045,7 +2045,7 @@
           <a:p>
             <a:fld id="{32F68AFB-3DBA-4041-9C55-6494DFF30A69}" type="datetimeFigureOut">
               <a:rPr lang="en-GB" smtClean="0"/>
-              <a:t>20/10/2025</a:t>
+              <a:t>28/01/2026</a:t>
             </a:fld>
             <a:endParaRPr lang="en-GB"/>
           </a:p>
@@ -2227,7 +2227,7 @@
           <a:p>
             <a:fld id="{32F68AFB-3DBA-4041-9C55-6494DFF30A69}" type="datetimeFigureOut">
               <a:rPr lang="en-GB" smtClean="0"/>
-              <a:t>20/10/2025</a:t>
+              <a:t>28/01/2026</a:t>
             </a:fld>
             <a:endParaRPr lang="en-GB"/>
           </a:p>
@@ -2399,7 +2399,7 @@
           <a:p>
             <a:fld id="{32F68AFB-3DBA-4041-9C55-6494DFF30A69}" type="datetimeFigureOut">
               <a:rPr lang="en-GB" smtClean="0"/>
-              <a:t>20/10/2025</a:t>
+              <a:t>28/01/2026</a:t>
             </a:fld>
             <a:endParaRPr lang="en-GB"/>
           </a:p>
@@ -2647,7 +2647,7 @@
           <a:p>
             <a:fld id="{32F68AFB-3DBA-4041-9C55-6494DFF30A69}" type="datetimeFigureOut">
               <a:rPr lang="en-GB" smtClean="0"/>
-              <a:t>20/10/2025</a:t>
+              <a:t>28/01/2026</a:t>
             </a:fld>
             <a:endParaRPr lang="en-GB"/>
           </a:p>
@@ -2881,7 +2881,7 @@
           <a:p>
             <a:fld id="{32F68AFB-3DBA-4041-9C55-6494DFF30A69}" type="datetimeFigureOut">
               <a:rPr lang="en-GB" smtClean="0"/>
-              <a:t>20/10/2025</a:t>
+              <a:t>28/01/2026</a:t>
             </a:fld>
             <a:endParaRPr lang="en-GB"/>
           </a:p>
@@ -3250,7 +3250,7 @@
           <a:p>
             <a:fld id="{32F68AFB-3DBA-4041-9C55-6494DFF30A69}" type="datetimeFigureOut">
               <a:rPr lang="en-GB" smtClean="0"/>
-              <a:t>20/10/2025</a:t>
+              <a:t>28/01/2026</a:t>
             </a:fld>
             <a:endParaRPr lang="en-GB"/>
           </a:p>
@@ -3370,7 +3370,7 @@
           <a:p>
             <a:fld id="{32F68AFB-3DBA-4041-9C55-6494DFF30A69}" type="datetimeFigureOut">
               <a:rPr lang="en-GB" smtClean="0"/>
-              <a:t>20/10/2025</a:t>
+              <a:t>28/01/2026</a:t>
             </a:fld>
             <a:endParaRPr lang="en-GB"/>
           </a:p>
@@ -3467,7 +3467,7 @@
           <a:p>
             <a:fld id="{32F68AFB-3DBA-4041-9C55-6494DFF30A69}" type="datetimeFigureOut">
               <a:rPr lang="en-GB" smtClean="0"/>
-              <a:t>20/10/2025</a:t>
+              <a:t>28/01/2026</a:t>
             </a:fld>
             <a:endParaRPr lang="en-GB"/>
           </a:p>
@@ -3745,7 +3745,7 @@
           <a:p>
             <a:fld id="{32F68AFB-3DBA-4041-9C55-6494DFF30A69}" type="datetimeFigureOut">
               <a:rPr lang="en-GB" smtClean="0"/>
-              <a:t>20/10/2025</a:t>
+              <a:t>28/01/2026</a:t>
             </a:fld>
             <a:endParaRPr lang="en-GB"/>
           </a:p>
@@ -4004,7 +4004,7 @@
           <a:p>
             <a:fld id="{32F68AFB-3DBA-4041-9C55-6494DFF30A69}" type="datetimeFigureOut">
               <a:rPr lang="en-GB" smtClean="0"/>
-              <a:t>20/10/2025</a:t>
+              <a:t>28/01/2026</a:t>
             </a:fld>
             <a:endParaRPr lang="en-GB"/>
           </a:p>
@@ -4219,7 +4219,7 @@
           <a:p>
             <a:fld id="{32F68AFB-3DBA-4041-9C55-6494DFF30A69}" type="datetimeFigureOut">
               <a:rPr lang="en-GB" smtClean="0"/>
-              <a:t>20/10/2025</a:t>
+              <a:t>28/01/2026</a:t>
             </a:fld>
             <a:endParaRPr lang="en-GB"/>
           </a:p>
@@ -5437,7 +5437,7 @@
               <a:rPr lang="en-GB" sz="1200" b="1" dirty="0">
                 <a:cs typeface="Arial" panose="020B0604020202020204" pitchFamily="34" charset="0"/>
               </a:rPr>
-              <a:t>Unsupported</a:t>
+              <a:t>Refuted</a:t>
             </a:r>
             <a:endParaRPr lang="en-GB" sz="1200" b="1" dirty="0">
               <a:solidFill>

</xml_diff>